<commit_message>
More touches to final presentation
</commit_message>
<xml_diff>
--- a/closing presentation.pptx
+++ b/closing presentation.pptx
@@ -114,6 +114,11 @@
       </a:defRPr>
     </a:lvl9pPr>
   </p:defaultTextStyle>
+  <p:extLst>
+    <p:ext uri="{EFAFB233-063F-42B5-8137-9DF3F51BA10A}">
+      <p15:sldGuideLst xmlns:p15="http://schemas.microsoft.com/office/powerpoint/2012/main"/>
+    </p:ext>
+  </p:extLst>
 </p:presentation>
 </file>
 
@@ -1393,8 +1398,8 @@
         </p:nvSpPr>
         <p:spPr>
           <a:xfrm>
-            <a:off x="1107000" y="812520"/>
-            <a:ext cx="5345280" cy="4008959"/>
+            <a:off x="1106488" y="812800"/>
+            <a:ext cx="5345112" cy="4008438"/>
           </a:xfrm>
           <a:solidFill>
             <a:srgbClr val="729FCF"/>
@@ -2458,8 +2463,8 @@
         </p:nvSpPr>
         <p:spPr>
           <a:xfrm>
-            <a:off x="1107000" y="812520"/>
-            <a:ext cx="5345280" cy="4008959"/>
+            <a:off x="1106488" y="812800"/>
+            <a:ext cx="5345112" cy="4008438"/>
           </a:xfrm>
           <a:solidFill>
             <a:srgbClr val="729FCF"/>
@@ -5555,37 +5560,88 @@
           <a:p>
             <a:pPr lvl="0"/>
             <a:r>
-              <a:rPr lang="en-IE"/>
+              <a:rPr lang="en-IE" dirty="0">
+                <a:latin typeface="+mn-lt"/>
+              </a:rPr>
               <a:t>Social Network Analysis &amp; Visualisation</a:t>
             </a:r>
             <a:br>
-              <a:rPr lang="en-IE"/>
+              <a:rPr lang="en-IE" dirty="0">
+                <a:latin typeface="+mn-lt"/>
+              </a:rPr>
             </a:br>
             <a:r>
-              <a:rPr lang="en-IE"/>
+              <a:rPr lang="en-IE" dirty="0">
+                <a:latin typeface="+mn-lt"/>
+              </a:rPr>
               <a:t/>
             </a:r>
             <a:br>
-              <a:rPr lang="en-IE"/>
+              <a:rPr lang="en-IE" dirty="0">
+                <a:latin typeface="+mn-lt"/>
+              </a:rPr>
             </a:br>
             <a:r>
-              <a:rPr lang="en-IE"/>
+              <a:rPr lang="en-IE" dirty="0">
+                <a:latin typeface="+mn-lt"/>
+              </a:rPr>
               <a:t>#SHDB17</a:t>
             </a:r>
             <a:br>
-              <a:rPr lang="en-IE"/>
+              <a:rPr lang="en-IE" dirty="0">
+                <a:latin typeface="+mn-lt"/>
+              </a:rPr>
             </a:br>
             <a:r>
-              <a:rPr lang="en-IE"/>
+              <a:rPr lang="en-IE" dirty="0">
+                <a:latin typeface="+mn-lt"/>
+              </a:rPr>
               <a:t/>
             </a:r>
             <a:br>
-              <a:rPr lang="en-IE"/>
+              <a:rPr lang="en-IE" dirty="0">
+                <a:latin typeface="+mn-lt"/>
+              </a:rPr>
             </a:br>
             <a:r>
-              <a:rPr lang="en-IE" sz="2400"/>
-              <a:t>Ellen König, Syennie Valeria, Thomas Beutin</a:t>
-            </a:r>
+              <a:rPr lang="en-IE" sz="2400" dirty="0">
+                <a:latin typeface="+mn-lt"/>
+              </a:rPr>
+              <a:t>Ellen </a:t>
+            </a:r>
+            <a:r>
+              <a:rPr lang="en-IE" sz="2400" dirty="0" err="1">
+                <a:latin typeface="+mn-lt"/>
+              </a:rPr>
+              <a:t>König</a:t>
+            </a:r>
+            <a:r>
+              <a:rPr lang="en-IE" sz="2400" dirty="0">
+                <a:latin typeface="+mn-lt"/>
+              </a:rPr>
+              <a:t>, </a:t>
+            </a:r>
+            <a:r>
+              <a:rPr lang="en-IE" sz="2400" dirty="0" err="1">
+                <a:latin typeface="+mn-lt"/>
+              </a:rPr>
+              <a:t>Syennie</a:t>
+            </a:r>
+            <a:r>
+              <a:rPr lang="en-IE" sz="2400" dirty="0">
+                <a:latin typeface="+mn-lt"/>
+              </a:rPr>
+              <a:t> Valeria, Thomas </a:t>
+            </a:r>
+            <a:r>
+              <a:rPr lang="en-IE" sz="2400" dirty="0" err="1">
+                <a:latin typeface="+mn-lt"/>
+              </a:rPr>
+              <a:t>Beutin</a:t>
+            </a:r>
+            <a:endParaRPr lang="en-IE" sz="2400" dirty="0">
+              <a:latin typeface="+mn-lt"/>
+            </a:endParaRPr>
           </a:p>
         </p:txBody>
       </p:sp>
@@ -5845,29 +5901,32 @@
       </p:grpSpPr>
       <p:pic>
         <p:nvPicPr>
-          <p:cNvPr id="2" name="Bildplatzhalter 1"/>
+          <p:cNvPr id="3" name="Bild 2"/>
           <p:cNvPicPr>
-            <a:picLocks noGrp="1" noChangeAspect="1"/>
+            <a:picLocks noChangeAspect="1"/>
           </p:cNvPicPr>
-          <p:nvPr>
-            <p:ph type="pic" idx="4294967295"/>
-          </p:nvPr>
+          <p:nvPr/>
         </p:nvPicPr>
         <p:blipFill>
           <a:blip r:embed="rId3">
-            <a:lum/>
-            <a:alphaModFix/>
+            <a:extLst>
+              <a:ext uri="{28A0092B-C50C-407E-A947-70E740481C1C}">
+                <a14:useLocalDpi xmlns:a14="http://schemas.microsoft.com/office/drawing/2010/main" val="0"/>
+              </a:ext>
+            </a:extLst>
           </a:blip>
-          <a:srcRect/>
           <a:stretch>
             <a:fillRect/>
           </a:stretch>
         </p:blipFill>
         <p:spPr>
           <a:xfrm>
-            <a:off x="467640" y="779400"/>
-            <a:ext cx="9071640" cy="6072840"/>
-          </a:xfrm>
+            <a:off x="0" y="581889"/>
+            <a:ext cx="9886954" cy="6591302"/>
+          </a:xfrm>
+          <a:prstGeom prst="rect">
+            <a:avLst/>
+          </a:prstGeom>
         </p:spPr>
       </p:pic>
     </p:spTree>
@@ -6053,7 +6112,7 @@
         </p:blipFill>
         <p:spPr>
           <a:xfrm>
-            <a:off x="190540" y="3939054"/>
+            <a:off x="41259" y="3939489"/>
             <a:ext cx="4977204" cy="3318136"/>
           </a:xfrm>
           <a:prstGeom prst="rect">
@@ -6125,7 +6184,7 @@
         </p:blipFill>
         <p:spPr>
           <a:xfrm>
-            <a:off x="5131672" y="3960930"/>
+            <a:off x="5051874" y="3935814"/>
             <a:ext cx="4912881" cy="3275254"/>
           </a:xfrm>
           <a:prstGeom prst="rect">

</xml_diff>